<commit_message>
Updated screens in ppt
</commit_message>
<xml_diff>
--- a/Health App.pptx
+++ b/Health App.pptx
@@ -8647,13 +8647,7 @@
       </p:sp>
       <p:pic>
         <p:nvPicPr>
-          <p:cNvPr id="4" name="Picture 3" descr="A screenshot of a cell phone&#10;&#10;Description automatically generated">
-            <a:extLst>
-              <a:ext uri="{FF2B5EF4-FFF2-40B4-BE49-F238E27FC236}">
-                <a16:creationId xmlns:a16="http://schemas.microsoft.com/office/drawing/2014/main" id="{EA6D14BA-9035-411A-96BE-7345EFB27EFA}"/>
-              </a:ext>
-            </a:extLst>
-          </p:cNvPr>
+          <p:cNvPr id="3" name="Picture 2"/>
           <p:cNvPicPr>
             <a:picLocks noChangeAspect="1"/>
           </p:cNvPicPr>
@@ -8673,8 +8667,8 @@
         </p:blipFill>
         <p:spPr>
           <a:xfrm>
-            <a:off x="4225258" y="619760"/>
-            <a:ext cx="3741484" cy="5384799"/>
+            <a:off x="3645074" y="425885"/>
+            <a:ext cx="3106454" cy="5504568"/>
           </a:xfrm>
           <a:prstGeom prst="rect">
             <a:avLst/>

</xml_diff>